<commit_message>
add leetcode 416 animation.
</commit_message>
<xml_diff>
--- a/0401-0500/LeetCode 第 416  题：“分割等和子集”题解配图.pptx
+++ b/0401-0500/LeetCode 第 416  题：“分割等和子集”题解配图.pptx
@@ -6,6 +6,7 @@
   </p:sldMasterIdLst>
   <p:sldIdLst>
     <p:sldId id="260" r:id="rId2"/>
+    <p:sldId id="261" r:id="rId3"/>
   </p:sldIdLst>
   <p:sldSz cx="12192000" cy="6858000"/>
   <p:notesSz cx="6858000" cy="9144000"/>
@@ -346,7 +347,7 @@
           <a:p>
             <a:fld id="{7C955CD6-C544-6447-88CB-A2D8D4C328B3}" type="datetimeFigureOut">
               <a:rPr kumimoji="1" lang="zh-CN" altLang="en-US" smtClean="0"/>
-              <a:t>2019/7/8</a:t>
+              <a:t>2019/7/21</a:t>
             </a:fld>
             <a:endParaRPr kumimoji="1" lang="zh-CN" altLang="en-US"/>
           </a:p>
@@ -741,6 +742,36 @@
           <a:chExt cx="0" cy="0"/>
         </a:xfrm>
       </p:grpSpPr>
+      <p:pic>
+        <p:nvPicPr>
+          <p:cNvPr id="4" name="图片 3">
+            <a:extLst>
+              <a:ext uri="{FF2B5EF4-FFF2-40B4-BE49-F238E27FC236}">
+                <a16:creationId xmlns:a16="http://schemas.microsoft.com/office/drawing/2014/main" id="{4C1D6AB5-716F-0243-8E8C-C1C1657E74EE}"/>
+              </a:ext>
+            </a:extLst>
+          </p:cNvPr>
+          <p:cNvPicPr>
+            <a:picLocks noChangeAspect="1"/>
+          </p:cNvPicPr>
+          <p:nvPr/>
+        </p:nvPicPr>
+        <p:blipFill>
+          <a:blip r:embed="rId2"/>
+          <a:stretch>
+            <a:fillRect/>
+          </a:stretch>
+        </p:blipFill>
+        <p:spPr>
+          <a:xfrm>
+            <a:off x="1039655" y="2898743"/>
+            <a:ext cx="9134568" cy="3044856"/>
+          </a:xfrm>
+          <a:prstGeom prst="rect">
+            <a:avLst/>
+          </a:prstGeom>
+        </p:spPr>
+      </p:pic>
       <p:sp>
         <p:nvSpPr>
           <p:cNvPr id="5" name="矩形 4">
@@ -837,36 +868,6 @@
           </a:p>
         </p:txBody>
       </p:sp>
-      <p:pic>
-        <p:nvPicPr>
-          <p:cNvPr id="2" name="图片 1">
-            <a:extLst>
-              <a:ext uri="{FF2B5EF4-FFF2-40B4-BE49-F238E27FC236}">
-                <a16:creationId xmlns:a16="http://schemas.microsoft.com/office/drawing/2014/main" id="{871ED829-F563-D248-B71E-69D12769FCB6}"/>
-              </a:ext>
-            </a:extLst>
-          </p:cNvPr>
-          <p:cNvPicPr>
-            <a:picLocks noChangeAspect="1"/>
-          </p:cNvPicPr>
-          <p:nvPr/>
-        </p:nvPicPr>
-        <p:blipFill>
-          <a:blip r:embed="rId2"/>
-          <a:stretch>
-            <a:fillRect/>
-          </a:stretch>
-        </p:blipFill>
-        <p:spPr>
-          <a:xfrm>
-            <a:off x="1777475" y="3028163"/>
-            <a:ext cx="8569131" cy="3089831"/>
-          </a:xfrm>
-          <a:prstGeom prst="rect">
-            <a:avLst/>
-          </a:prstGeom>
-        </p:spPr>
-      </p:pic>
       <p:sp>
         <p:nvSpPr>
           <p:cNvPr id="3" name="矩形 2">
@@ -1074,8 +1075,8 @@
         </p:nvCxnSpPr>
         <p:spPr>
           <a:xfrm flipH="1">
-            <a:off x="10124388" y="2309567"/>
-            <a:ext cx="222218" cy="2111604"/>
+            <a:off x="10001839" y="2309567"/>
+            <a:ext cx="360920" cy="2196445"/>
           </a:xfrm>
           <a:prstGeom prst="straightConnector1">
             <a:avLst/>
@@ -1306,6 +1307,820 @@
     <p:extLst>
       <p:ext uri="{BB962C8B-B14F-4D97-AF65-F5344CB8AC3E}">
         <p14:creationId xmlns:p14="http://schemas.microsoft.com/office/powerpoint/2010/main" val="401937125"/>
+      </p:ext>
+    </p:extLst>
+  </p:cSld>
+  <p:clrMapOvr>
+    <a:masterClrMapping/>
+  </p:clrMapOvr>
+</p:sld>
+</file>
+
+<file path=ppt/slides/slide2.xml><?xml version="1.0" encoding="utf-8"?>
+<p:sld xmlns:a="http://schemas.openxmlformats.org/drawingml/2006/main" xmlns:r="http://schemas.openxmlformats.org/officeDocument/2006/relationships" xmlns:p="http://schemas.openxmlformats.org/presentationml/2006/main">
+  <p:cSld>
+    <p:spTree>
+      <p:nvGrpSpPr>
+        <p:cNvPr id="1" name=""/>
+        <p:cNvGrpSpPr/>
+        <p:nvPr/>
+      </p:nvGrpSpPr>
+      <p:grpSpPr>
+        <a:xfrm>
+          <a:off x="0" y="0"/>
+          <a:ext cx="0" cy="0"/>
+          <a:chOff x="0" y="0"/>
+          <a:chExt cx="0" cy="0"/>
+        </a:xfrm>
+      </p:grpSpPr>
+      <p:pic>
+        <p:nvPicPr>
+          <p:cNvPr id="10" name="图片 9">
+            <a:extLst>
+              <a:ext uri="{FF2B5EF4-FFF2-40B4-BE49-F238E27FC236}">
+                <a16:creationId xmlns:a16="http://schemas.microsoft.com/office/drawing/2014/main" id="{58698E99-54D5-DD40-BD43-1976190A0E9F}"/>
+              </a:ext>
+            </a:extLst>
+          </p:cNvPr>
+          <p:cNvPicPr>
+            <a:picLocks noChangeAspect="1"/>
+          </p:cNvPicPr>
+          <p:nvPr/>
+        </p:nvPicPr>
+        <p:blipFill>
+          <a:blip r:embed="rId2"/>
+          <a:stretch>
+            <a:fillRect/>
+          </a:stretch>
+        </p:blipFill>
+        <p:spPr>
+          <a:xfrm>
+            <a:off x="973993" y="930031"/>
+            <a:ext cx="10087912" cy="2915138"/>
+          </a:xfrm>
+          <a:prstGeom prst="rect">
+            <a:avLst/>
+          </a:prstGeom>
+        </p:spPr>
+      </p:pic>
+      <p:cxnSp>
+        <p:nvCxnSpPr>
+          <p:cNvPr id="3" name="直线箭头连接符 2">
+            <a:extLst>
+              <a:ext uri="{FF2B5EF4-FFF2-40B4-BE49-F238E27FC236}">
+                <a16:creationId xmlns:a16="http://schemas.microsoft.com/office/drawing/2014/main" id="{B39D063C-5AD2-FA49-9F28-8BCC895CD1F5}"/>
+              </a:ext>
+            </a:extLst>
+          </p:cNvPr>
+          <p:cNvCxnSpPr>
+            <a:cxnSpLocks/>
+          </p:cNvCxnSpPr>
+          <p:nvPr/>
+        </p:nvCxnSpPr>
+        <p:spPr>
+          <a:xfrm flipH="1" flipV="1">
+            <a:off x="4103077" y="1852246"/>
+            <a:ext cx="3198548" cy="535355"/>
+          </a:xfrm>
+          <a:prstGeom prst="straightConnector1">
+            <a:avLst/>
+          </a:prstGeom>
+          <a:ln w="88900">
+            <a:solidFill>
+              <a:srgbClr val="FF0000"/>
+            </a:solidFill>
+            <a:tailEnd type="triangle"/>
+          </a:ln>
+          <a:effectLst>
+            <a:outerShdw blurRad="50800" dist="38100" algn="l" rotWithShape="0">
+              <a:prstClr val="black">
+                <a:alpha val="40000"/>
+              </a:prstClr>
+            </a:outerShdw>
+          </a:effectLst>
+        </p:spPr>
+        <p:style>
+          <a:lnRef idx="1">
+            <a:schemeClr val="accent1"/>
+          </a:lnRef>
+          <a:fillRef idx="0">
+            <a:schemeClr val="accent1"/>
+          </a:fillRef>
+          <a:effectRef idx="0">
+            <a:schemeClr val="accent1"/>
+          </a:effectRef>
+          <a:fontRef idx="minor">
+            <a:schemeClr val="tx1"/>
+          </a:fontRef>
+        </p:style>
+      </p:cxnSp>
+      <p:cxnSp>
+        <p:nvCxnSpPr>
+          <p:cNvPr id="6" name="直线箭头连接符 5">
+            <a:extLst>
+              <a:ext uri="{FF2B5EF4-FFF2-40B4-BE49-F238E27FC236}">
+                <a16:creationId xmlns:a16="http://schemas.microsoft.com/office/drawing/2014/main" id="{10F000D4-B405-C446-ABDD-0C76869F359C}"/>
+              </a:ext>
+            </a:extLst>
+          </p:cNvPr>
+          <p:cNvCxnSpPr>
+            <a:cxnSpLocks/>
+          </p:cNvCxnSpPr>
+          <p:nvPr/>
+        </p:nvCxnSpPr>
+        <p:spPr>
+          <a:xfrm flipV="1">
+            <a:off x="7549661" y="1852246"/>
+            <a:ext cx="1" cy="494746"/>
+          </a:xfrm>
+          <a:prstGeom prst="straightConnector1">
+            <a:avLst/>
+          </a:prstGeom>
+          <a:ln w="88900">
+            <a:solidFill>
+              <a:srgbClr val="FF0000"/>
+            </a:solidFill>
+            <a:tailEnd type="triangle"/>
+          </a:ln>
+          <a:effectLst>
+            <a:outerShdw blurRad="50800" dist="38100" algn="l" rotWithShape="0">
+              <a:prstClr val="black">
+                <a:alpha val="40000"/>
+              </a:prstClr>
+            </a:outerShdw>
+          </a:effectLst>
+        </p:spPr>
+        <p:style>
+          <a:lnRef idx="1">
+            <a:schemeClr val="accent1"/>
+          </a:lnRef>
+          <a:fillRef idx="0">
+            <a:schemeClr val="accent1"/>
+          </a:fillRef>
+          <a:effectRef idx="0">
+            <a:schemeClr val="accent1"/>
+          </a:effectRef>
+          <a:fontRef idx="minor">
+            <a:schemeClr val="tx1"/>
+          </a:fontRef>
+        </p:style>
+      </p:cxnSp>
+      <p:sp>
+        <p:nvSpPr>
+          <p:cNvPr id="8" name="矩形 7">
+            <a:extLst>
+              <a:ext uri="{FF2B5EF4-FFF2-40B4-BE49-F238E27FC236}">
+                <a16:creationId xmlns:a16="http://schemas.microsoft.com/office/drawing/2014/main" id="{C9246D50-5FC8-D947-BD7E-CBE495BB27F4}"/>
+              </a:ext>
+            </a:extLst>
+          </p:cNvPr>
+          <p:cNvSpPr/>
+          <p:nvPr/>
+        </p:nvSpPr>
+        <p:spPr>
+          <a:xfrm>
+            <a:off x="138357" y="3937262"/>
+            <a:ext cx="11934092" cy="2862322"/>
+          </a:xfrm>
+          <a:prstGeom prst="rect">
+            <a:avLst/>
+          </a:prstGeom>
+        </p:spPr>
+        <p:txBody>
+          <a:bodyPr wrap="square">
+            <a:spAutoFit/>
+          </a:bodyPr>
+          <a:lstStyle/>
+          <a:p>
+            <a:r>
+              <a:rPr lang="zh-CN" altLang="en-US" dirty="0">
+                <a:latin typeface="Times New Roman" panose="02020603050405020304" pitchFamily="18" charset="0"/>
+                <a:ea typeface="KaiTi_GB2312" panose="02010609030101010101" pitchFamily="49" charset="-122"/>
+                <a:cs typeface="Times New Roman" panose="02020603050405020304" pitchFamily="18" charset="0"/>
+              </a:rPr>
+              <a:t>以填写 </a:t>
+            </a:r>
+            <a:r>
+              <a:rPr lang="en-US" altLang="zh-CN" dirty="0" err="1">
+                <a:latin typeface="Times New Roman" panose="02020603050405020304" pitchFamily="18" charset="0"/>
+                <a:ea typeface="KaiTi_GB2312" panose="02010609030101010101" pitchFamily="49" charset="-122"/>
+                <a:cs typeface="Times New Roman" panose="02020603050405020304" pitchFamily="18" charset="0"/>
+              </a:rPr>
+              <a:t>dp</a:t>
+            </a:r>
+            <a:r>
+              <a:rPr lang="en-US" altLang="zh-CN" dirty="0">
+                <a:latin typeface="Times New Roman" panose="02020603050405020304" pitchFamily="18" charset="0"/>
+                <a:ea typeface="KaiTi_GB2312" panose="02010609030101010101" pitchFamily="49" charset="-122"/>
+                <a:cs typeface="Times New Roman" panose="02020603050405020304" pitchFamily="18" charset="0"/>
+              </a:rPr>
+              <a:t>[1][6] </a:t>
+            </a:r>
+            <a:r>
+              <a:rPr lang="zh-CN" altLang="en-US" dirty="0">
+                <a:latin typeface="Times New Roman" panose="02020603050405020304" pitchFamily="18" charset="0"/>
+                <a:ea typeface="KaiTi_GB2312" panose="02010609030101010101" pitchFamily="49" charset="-122"/>
+                <a:cs typeface="Times New Roman" panose="02020603050405020304" pitchFamily="18" charset="0"/>
+              </a:rPr>
+              <a:t>为例。</a:t>
+            </a:r>
+          </a:p>
+          <a:p>
+            <a:endParaRPr lang="zh-CN" altLang="en-US" dirty="0">
+              <a:latin typeface="Times New Roman" panose="02020603050405020304" pitchFamily="18" charset="0"/>
+              <a:ea typeface="KaiTi_GB2312" panose="02010609030101010101" pitchFamily="49" charset="-122"/>
+              <a:cs typeface="Times New Roman" panose="02020603050405020304" pitchFamily="18" charset="0"/>
+            </a:endParaRPr>
+          </a:p>
+          <a:p>
+            <a:r>
+              <a:rPr lang="en-US" altLang="zh-CN" dirty="0" err="1">
+                <a:latin typeface="Times New Roman" panose="02020603050405020304" pitchFamily="18" charset="0"/>
+                <a:ea typeface="KaiTi_GB2312" panose="02010609030101010101" pitchFamily="49" charset="-122"/>
+                <a:cs typeface="Times New Roman" panose="02020603050405020304" pitchFamily="18" charset="0"/>
+              </a:rPr>
+              <a:t>dp</a:t>
+            </a:r>
+            <a:r>
+              <a:rPr lang="en-US" altLang="zh-CN" dirty="0">
+                <a:latin typeface="Times New Roman" panose="02020603050405020304" pitchFamily="18" charset="0"/>
+                <a:ea typeface="KaiTi_GB2312" panose="02010609030101010101" pitchFamily="49" charset="-122"/>
+                <a:cs typeface="Times New Roman" panose="02020603050405020304" pitchFamily="18" charset="0"/>
+              </a:rPr>
+              <a:t>[1][6] </a:t>
+            </a:r>
+            <a:r>
+              <a:rPr lang="zh-CN" altLang="en-US" dirty="0">
+                <a:latin typeface="Times New Roman" panose="02020603050405020304" pitchFamily="18" charset="0"/>
+                <a:ea typeface="KaiTi_GB2312" panose="02010609030101010101" pitchFamily="49" charset="-122"/>
+                <a:cs typeface="Times New Roman" panose="02020603050405020304" pitchFamily="18" charset="0"/>
+              </a:rPr>
+              <a:t>的含义是：考虑数组 </a:t>
+            </a:r>
+            <a:r>
+              <a:rPr lang="en-US" altLang="zh-CN" dirty="0" err="1">
+                <a:latin typeface="Times New Roman" panose="02020603050405020304" pitchFamily="18" charset="0"/>
+                <a:ea typeface="KaiTi_GB2312" panose="02010609030101010101" pitchFamily="49" charset="-122"/>
+                <a:cs typeface="Times New Roman" panose="02020603050405020304" pitchFamily="18" charset="0"/>
+              </a:rPr>
+              <a:t>nums</a:t>
+            </a:r>
+            <a:r>
+              <a:rPr lang="en-US" altLang="zh-CN" dirty="0">
+                <a:latin typeface="Times New Roman" panose="02020603050405020304" pitchFamily="18" charset="0"/>
+                <a:ea typeface="KaiTi_GB2312" panose="02010609030101010101" pitchFamily="49" charset="-122"/>
+                <a:cs typeface="Times New Roman" panose="02020603050405020304" pitchFamily="18" charset="0"/>
+              </a:rPr>
+              <a:t> </a:t>
+            </a:r>
+            <a:r>
+              <a:rPr lang="zh-CN" altLang="en-US" dirty="0">
+                <a:latin typeface="Times New Roman" panose="02020603050405020304" pitchFamily="18" charset="0"/>
+                <a:ea typeface="KaiTi_GB2312" panose="02010609030101010101" pitchFamily="49" charset="-122"/>
+                <a:cs typeface="Times New Roman" panose="02020603050405020304" pitchFamily="18" charset="0"/>
+              </a:rPr>
+              <a:t>在索引 </a:t>
+            </a:r>
+            <a:r>
+              <a:rPr lang="en-US" altLang="zh-CN" dirty="0">
+                <a:latin typeface="Times New Roman" panose="02020603050405020304" pitchFamily="18" charset="0"/>
+                <a:ea typeface="KaiTi_GB2312" panose="02010609030101010101" pitchFamily="49" charset="-122"/>
+                <a:cs typeface="Times New Roman" panose="02020603050405020304" pitchFamily="18" charset="0"/>
+              </a:rPr>
+              <a:t>[0:1] </a:t>
+            </a:r>
+            <a:r>
+              <a:rPr lang="zh-CN" altLang="en-US" dirty="0">
+                <a:latin typeface="Times New Roman" panose="02020603050405020304" pitchFamily="18" charset="0"/>
+                <a:ea typeface="KaiTi_GB2312" panose="02010609030101010101" pitchFamily="49" charset="-122"/>
+                <a:cs typeface="Times New Roman" panose="02020603050405020304" pitchFamily="18" charset="0"/>
+              </a:rPr>
+              <a:t>范围内的数，是否能够挑选出一些正整数，且每个数只能使用一次，使得它们的和为 </a:t>
+            </a:r>
+            <a:r>
+              <a:rPr lang="en-US" altLang="zh-CN" dirty="0">
+                <a:latin typeface="Times New Roman" panose="02020603050405020304" pitchFamily="18" charset="0"/>
+                <a:ea typeface="KaiTi_GB2312" panose="02010609030101010101" pitchFamily="49" charset="-122"/>
+                <a:cs typeface="Times New Roman" panose="02020603050405020304" pitchFamily="18" charset="0"/>
+              </a:rPr>
+              <a:t>6</a:t>
+            </a:r>
+            <a:r>
+              <a:rPr lang="zh-CN" altLang="en-US" dirty="0">
+                <a:latin typeface="Times New Roman" panose="02020603050405020304" pitchFamily="18" charset="0"/>
+                <a:ea typeface="KaiTi_GB2312" panose="02010609030101010101" pitchFamily="49" charset="-122"/>
+                <a:cs typeface="Times New Roman" panose="02020603050405020304" pitchFamily="18" charset="0"/>
+              </a:rPr>
+              <a:t>。分两种情况考虑。</a:t>
+            </a:r>
+          </a:p>
+          <a:p>
+            <a:endParaRPr lang="zh-CN" altLang="en-US" dirty="0">
+              <a:latin typeface="Times New Roman" panose="02020603050405020304" pitchFamily="18" charset="0"/>
+              <a:ea typeface="KaiTi_GB2312" panose="02010609030101010101" pitchFamily="49" charset="-122"/>
+              <a:cs typeface="Times New Roman" panose="02020603050405020304" pitchFamily="18" charset="0"/>
+            </a:endParaRPr>
+          </a:p>
+          <a:p>
+            <a:r>
+              <a:rPr lang="en-US" altLang="zh-CN" dirty="0">
+                <a:latin typeface="Times New Roman" panose="02020603050405020304" pitchFamily="18" charset="0"/>
+                <a:ea typeface="KaiTi_GB2312" panose="02010609030101010101" pitchFamily="49" charset="-122"/>
+                <a:cs typeface="Times New Roman" panose="02020603050405020304" pitchFamily="18" charset="0"/>
+              </a:rPr>
+              <a:t>1</a:t>
+            </a:r>
+            <a:r>
+              <a:rPr lang="zh-CN" altLang="en-US" dirty="0">
+                <a:latin typeface="Times New Roman" panose="02020603050405020304" pitchFamily="18" charset="0"/>
+                <a:ea typeface="KaiTi_GB2312" panose="02010609030101010101" pitchFamily="49" charset="-122"/>
+                <a:cs typeface="Times New Roman" panose="02020603050405020304" pitchFamily="18" charset="0"/>
+              </a:rPr>
+              <a:t>、如果我们不考虑 </a:t>
+            </a:r>
+            <a:r>
+              <a:rPr lang="en-US" altLang="zh-CN" dirty="0" err="1">
+                <a:latin typeface="Times New Roman" panose="02020603050405020304" pitchFamily="18" charset="0"/>
+                <a:ea typeface="KaiTi_GB2312" panose="02010609030101010101" pitchFamily="49" charset="-122"/>
+                <a:cs typeface="Times New Roman" panose="02020603050405020304" pitchFamily="18" charset="0"/>
+              </a:rPr>
+              <a:t>nums</a:t>
+            </a:r>
+            <a:r>
+              <a:rPr lang="en-US" altLang="zh-CN" dirty="0">
+                <a:latin typeface="Times New Roman" panose="02020603050405020304" pitchFamily="18" charset="0"/>
+                <a:ea typeface="KaiTi_GB2312" panose="02010609030101010101" pitchFamily="49" charset="-122"/>
+                <a:cs typeface="Times New Roman" panose="02020603050405020304" pitchFamily="18" charset="0"/>
+              </a:rPr>
+              <a:t>[1] </a:t>
+            </a:r>
+            <a:r>
+              <a:rPr lang="zh-CN" altLang="en-US" dirty="0">
+                <a:latin typeface="Times New Roman" panose="02020603050405020304" pitchFamily="18" charset="0"/>
+                <a:ea typeface="KaiTi_GB2312" panose="02010609030101010101" pitchFamily="49" charset="-122"/>
+                <a:cs typeface="Times New Roman" panose="02020603050405020304" pitchFamily="18" charset="0"/>
+              </a:rPr>
+              <a:t>这个数，如果之前 </a:t>
+            </a:r>
+            <a:r>
+              <a:rPr lang="en-US" altLang="zh-CN" dirty="0" err="1">
+                <a:latin typeface="Times New Roman" panose="02020603050405020304" pitchFamily="18" charset="0"/>
+                <a:ea typeface="KaiTi_GB2312" panose="02010609030101010101" pitchFamily="49" charset="-122"/>
+                <a:cs typeface="Times New Roman" panose="02020603050405020304" pitchFamily="18" charset="0"/>
+              </a:rPr>
+              <a:t>dp</a:t>
+            </a:r>
+            <a:r>
+              <a:rPr lang="en-US" altLang="zh-CN" dirty="0">
+                <a:latin typeface="Times New Roman" panose="02020603050405020304" pitchFamily="18" charset="0"/>
+                <a:ea typeface="KaiTi_GB2312" panose="02010609030101010101" pitchFamily="49" charset="-122"/>
+                <a:cs typeface="Times New Roman" panose="02020603050405020304" pitchFamily="18" charset="0"/>
+              </a:rPr>
+              <a:t>[0][6] </a:t>
+            </a:r>
+            <a:r>
+              <a:rPr lang="zh-CN" altLang="en-US" dirty="0">
+                <a:latin typeface="Times New Roman" panose="02020603050405020304" pitchFamily="18" charset="0"/>
+                <a:ea typeface="KaiTi_GB2312" panose="02010609030101010101" pitchFamily="49" charset="-122"/>
+                <a:cs typeface="Times New Roman" panose="02020603050405020304" pitchFamily="18" charset="0"/>
+              </a:rPr>
+              <a:t>就为 </a:t>
+            </a:r>
+            <a:r>
+              <a:rPr lang="en-US" altLang="zh-CN" dirty="0">
+                <a:latin typeface="Times New Roman" panose="02020603050405020304" pitchFamily="18" charset="0"/>
+                <a:ea typeface="KaiTi_GB2312" panose="02010609030101010101" pitchFamily="49" charset="-122"/>
+                <a:cs typeface="Times New Roman" panose="02020603050405020304" pitchFamily="18" charset="0"/>
+              </a:rPr>
+              <a:t>True </a:t>
+            </a:r>
+            <a:r>
+              <a:rPr lang="zh-CN" altLang="en-US" dirty="0">
+                <a:latin typeface="Times New Roman" panose="02020603050405020304" pitchFamily="18" charset="0"/>
+                <a:ea typeface="KaiTi_GB2312" panose="02010609030101010101" pitchFamily="49" charset="-122"/>
+                <a:cs typeface="Times New Roman" panose="02020603050405020304" pitchFamily="18" charset="0"/>
+              </a:rPr>
+              <a:t>了，那么 </a:t>
+            </a:r>
+            <a:r>
+              <a:rPr lang="en-US" altLang="zh-CN" dirty="0" err="1">
+                <a:latin typeface="Times New Roman" panose="02020603050405020304" pitchFamily="18" charset="0"/>
+                <a:ea typeface="KaiTi_GB2312" panose="02010609030101010101" pitchFamily="49" charset="-122"/>
+                <a:cs typeface="Times New Roman" panose="02020603050405020304" pitchFamily="18" charset="0"/>
+              </a:rPr>
+              <a:t>dp</a:t>
+            </a:r>
+            <a:r>
+              <a:rPr lang="en-US" altLang="zh-CN" dirty="0">
+                <a:latin typeface="Times New Roman" panose="02020603050405020304" pitchFamily="18" charset="0"/>
+                <a:ea typeface="KaiTi_GB2312" panose="02010609030101010101" pitchFamily="49" charset="-122"/>
+                <a:cs typeface="Times New Roman" panose="02020603050405020304" pitchFamily="18" charset="0"/>
+              </a:rPr>
+              <a:t>[1][6] </a:t>
+            </a:r>
+            <a:r>
+              <a:rPr lang="zh-CN" altLang="en-US" dirty="0">
+                <a:latin typeface="Times New Roman" panose="02020603050405020304" pitchFamily="18" charset="0"/>
+                <a:ea typeface="KaiTi_GB2312" panose="02010609030101010101" pitchFamily="49" charset="-122"/>
+                <a:cs typeface="Times New Roman" panose="02020603050405020304" pitchFamily="18" charset="0"/>
+              </a:rPr>
+              <a:t>肯定也是 </a:t>
+            </a:r>
+            <a:r>
+              <a:rPr lang="en-US" altLang="zh-CN" dirty="0">
+                <a:latin typeface="Times New Roman" panose="02020603050405020304" pitchFamily="18" charset="0"/>
+                <a:ea typeface="KaiTi_GB2312" panose="02010609030101010101" pitchFamily="49" charset="-122"/>
+                <a:cs typeface="Times New Roman" panose="02020603050405020304" pitchFamily="18" charset="0"/>
+              </a:rPr>
+              <a:t>true</a:t>
+            </a:r>
+            <a:r>
+              <a:rPr lang="zh-CN" altLang="en-US" dirty="0">
+                <a:latin typeface="Times New Roman" panose="02020603050405020304" pitchFamily="18" charset="0"/>
+                <a:ea typeface="KaiTi_GB2312" panose="02010609030101010101" pitchFamily="49" charset="-122"/>
+                <a:cs typeface="Times New Roman" panose="02020603050405020304" pitchFamily="18" charset="0"/>
+              </a:rPr>
+              <a:t>，这里 </a:t>
+            </a:r>
+            <a:r>
+              <a:rPr lang="en-US" altLang="zh-CN" dirty="0" err="1">
+                <a:latin typeface="Times New Roman" panose="02020603050405020304" pitchFamily="18" charset="0"/>
+                <a:ea typeface="KaiTi_GB2312" panose="02010609030101010101" pitchFamily="49" charset="-122"/>
+                <a:cs typeface="Times New Roman" panose="02020603050405020304" pitchFamily="18" charset="0"/>
+              </a:rPr>
+              <a:t>dp</a:t>
+            </a:r>
+            <a:r>
+              <a:rPr lang="en-US" altLang="zh-CN" dirty="0">
+                <a:latin typeface="Times New Roman" panose="02020603050405020304" pitchFamily="18" charset="0"/>
+                <a:ea typeface="KaiTi_GB2312" panose="02010609030101010101" pitchFamily="49" charset="-122"/>
+                <a:cs typeface="Times New Roman" panose="02020603050405020304" pitchFamily="18" charset="0"/>
+              </a:rPr>
+              <a:t>[0][6] = False</a:t>
+            </a:r>
+            <a:r>
+              <a:rPr lang="zh-CN" altLang="en-US" dirty="0">
+                <a:latin typeface="Times New Roman" panose="02020603050405020304" pitchFamily="18" charset="0"/>
+                <a:ea typeface="KaiTi_GB2312" panose="02010609030101010101" pitchFamily="49" charset="-122"/>
+                <a:cs typeface="Times New Roman" panose="02020603050405020304" pitchFamily="18" charset="0"/>
+              </a:rPr>
+              <a:t>，考虑下一种情况。</a:t>
+            </a:r>
+            <a:endParaRPr lang="en-US" altLang="zh-CN" dirty="0">
+              <a:latin typeface="Times New Roman" panose="02020603050405020304" pitchFamily="18" charset="0"/>
+              <a:ea typeface="KaiTi_GB2312" panose="02010609030101010101" pitchFamily="49" charset="-122"/>
+              <a:cs typeface="Times New Roman" panose="02020603050405020304" pitchFamily="18" charset="0"/>
+            </a:endParaRPr>
+          </a:p>
+          <a:p>
+            <a:endParaRPr lang="zh-CN" altLang="en-US" dirty="0">
+              <a:latin typeface="Times New Roman" panose="02020603050405020304" pitchFamily="18" charset="0"/>
+              <a:ea typeface="KaiTi_GB2312" panose="02010609030101010101" pitchFamily="49" charset="-122"/>
+              <a:cs typeface="Times New Roman" panose="02020603050405020304" pitchFamily="18" charset="0"/>
+            </a:endParaRPr>
+          </a:p>
+          <a:p>
+            <a:r>
+              <a:rPr lang="en-US" altLang="zh-CN" dirty="0">
+                <a:latin typeface="Times New Roman" panose="02020603050405020304" pitchFamily="18" charset="0"/>
+                <a:ea typeface="KaiTi_GB2312" panose="02010609030101010101" pitchFamily="49" charset="-122"/>
+                <a:cs typeface="Times New Roman" panose="02020603050405020304" pitchFamily="18" charset="0"/>
+              </a:rPr>
+              <a:t>2</a:t>
+            </a:r>
+            <a:r>
+              <a:rPr lang="zh-CN" altLang="en-US" dirty="0">
+                <a:latin typeface="Times New Roman" panose="02020603050405020304" pitchFamily="18" charset="0"/>
+                <a:ea typeface="KaiTi_GB2312" panose="02010609030101010101" pitchFamily="49" charset="-122"/>
+                <a:cs typeface="Times New Roman" panose="02020603050405020304" pitchFamily="18" charset="0"/>
+              </a:rPr>
+              <a:t>、如果我们考虑 </a:t>
+            </a:r>
+            <a:r>
+              <a:rPr lang="en-US" altLang="zh-CN" dirty="0" err="1">
+                <a:latin typeface="Times New Roman" panose="02020603050405020304" pitchFamily="18" charset="0"/>
+                <a:ea typeface="KaiTi_GB2312" panose="02010609030101010101" pitchFamily="49" charset="-122"/>
+                <a:cs typeface="Times New Roman" panose="02020603050405020304" pitchFamily="18" charset="0"/>
+              </a:rPr>
+              <a:t>nums</a:t>
+            </a:r>
+            <a:r>
+              <a:rPr lang="en-US" altLang="zh-CN" dirty="0">
+                <a:latin typeface="Times New Roman" panose="02020603050405020304" pitchFamily="18" charset="0"/>
+                <a:ea typeface="KaiTi_GB2312" panose="02010609030101010101" pitchFamily="49" charset="-122"/>
+                <a:cs typeface="Times New Roman" panose="02020603050405020304" pitchFamily="18" charset="0"/>
+              </a:rPr>
+              <a:t>[1] </a:t>
+            </a:r>
+            <a:r>
+              <a:rPr lang="zh-CN" altLang="en-US" dirty="0">
+                <a:latin typeface="Times New Roman" panose="02020603050405020304" pitchFamily="18" charset="0"/>
+                <a:ea typeface="KaiTi_GB2312" panose="02010609030101010101" pitchFamily="49" charset="-122"/>
+                <a:cs typeface="Times New Roman" panose="02020603050405020304" pitchFamily="18" charset="0"/>
+              </a:rPr>
+              <a:t>这个数，</a:t>
+            </a:r>
+            <a:r>
+              <a:rPr lang="en-US" altLang="zh-CN" dirty="0">
+                <a:latin typeface="Times New Roman" panose="02020603050405020304" pitchFamily="18" charset="0"/>
+                <a:ea typeface="KaiTi_GB2312" panose="02010609030101010101" pitchFamily="49" charset="-122"/>
+                <a:cs typeface="Times New Roman" panose="02020603050405020304" pitchFamily="18" charset="0"/>
+              </a:rPr>
+              <a:t>nums1 = 5</a:t>
+            </a:r>
+            <a:r>
+              <a:rPr lang="zh-CN" altLang="en-US" dirty="0">
+                <a:latin typeface="Times New Roman" panose="02020603050405020304" pitchFamily="18" charset="0"/>
+                <a:ea typeface="KaiTi_GB2312" panose="02010609030101010101" pitchFamily="49" charset="-122"/>
+                <a:cs typeface="Times New Roman" panose="02020603050405020304" pitchFamily="18" charset="0"/>
+              </a:rPr>
+              <a:t>，那么就看之前的数能不能使得它们的和为 </a:t>
+            </a:r>
+            <a:r>
+              <a:rPr lang="en-US" altLang="zh-CN" dirty="0">
+                <a:latin typeface="Times New Roman" panose="02020603050405020304" pitchFamily="18" charset="0"/>
+                <a:ea typeface="KaiTi_GB2312" panose="02010609030101010101" pitchFamily="49" charset="-122"/>
+                <a:cs typeface="Times New Roman" panose="02020603050405020304" pitchFamily="18" charset="0"/>
+              </a:rPr>
+              <a:t>(6-5=)1 </a:t>
+            </a:r>
+            <a:r>
+              <a:rPr lang="zh-CN" altLang="en-US" dirty="0">
+                <a:latin typeface="Times New Roman" panose="02020603050405020304" pitchFamily="18" charset="0"/>
+                <a:ea typeface="KaiTi_GB2312" panose="02010609030101010101" pitchFamily="49" charset="-122"/>
+                <a:cs typeface="Times New Roman" panose="02020603050405020304" pitchFamily="18" charset="0"/>
+              </a:rPr>
+              <a:t>，即看 </a:t>
+            </a:r>
+            <a:r>
+              <a:rPr lang="en-US" altLang="zh-CN" dirty="0" err="1">
+                <a:latin typeface="Times New Roman" panose="02020603050405020304" pitchFamily="18" charset="0"/>
+                <a:ea typeface="KaiTi_GB2312" panose="02010609030101010101" pitchFamily="49" charset="-122"/>
+                <a:cs typeface="Times New Roman" panose="02020603050405020304" pitchFamily="18" charset="0"/>
+              </a:rPr>
+              <a:t>dp</a:t>
+            </a:r>
+            <a:r>
+              <a:rPr lang="en-US" altLang="zh-CN" dirty="0">
+                <a:latin typeface="Times New Roman" panose="02020603050405020304" pitchFamily="18" charset="0"/>
+                <a:ea typeface="KaiTi_GB2312" panose="02010609030101010101" pitchFamily="49" charset="-122"/>
+                <a:cs typeface="Times New Roman" panose="02020603050405020304" pitchFamily="18" charset="0"/>
+              </a:rPr>
+              <a:t>[0][1]</a:t>
+            </a:r>
+            <a:r>
+              <a:rPr lang="zh-CN" altLang="en-US" dirty="0">
+                <a:latin typeface="Times New Roman" panose="02020603050405020304" pitchFamily="18" charset="0"/>
+                <a:ea typeface="KaiTi_GB2312" panose="02010609030101010101" pitchFamily="49" charset="-122"/>
+                <a:cs typeface="Times New Roman" panose="02020603050405020304" pitchFamily="18" charset="0"/>
+              </a:rPr>
+              <a:t>，此时为 </a:t>
+            </a:r>
+            <a:r>
+              <a:rPr lang="en-US" altLang="zh-CN" dirty="0">
+                <a:latin typeface="Times New Roman" panose="02020603050405020304" pitchFamily="18" charset="0"/>
+                <a:ea typeface="KaiTi_GB2312" panose="02010609030101010101" pitchFamily="49" charset="-122"/>
+                <a:cs typeface="Times New Roman" panose="02020603050405020304" pitchFamily="18" charset="0"/>
+              </a:rPr>
+              <a:t>True </a:t>
+            </a:r>
+            <a:r>
+              <a:rPr lang="zh-CN" altLang="en-US" dirty="0">
+                <a:latin typeface="Times New Roman" panose="02020603050405020304" pitchFamily="18" charset="0"/>
+                <a:ea typeface="KaiTi_GB2312" panose="02010609030101010101" pitchFamily="49" charset="-122"/>
+                <a:cs typeface="Times New Roman" panose="02020603050405020304" pitchFamily="18" charset="0"/>
+              </a:rPr>
+              <a:t>，则 </a:t>
+            </a:r>
+            <a:r>
+              <a:rPr lang="en-US" altLang="zh-CN" dirty="0" err="1">
+                <a:latin typeface="Times New Roman" panose="02020603050405020304" pitchFamily="18" charset="0"/>
+                <a:ea typeface="KaiTi_GB2312" panose="02010609030101010101" pitchFamily="49" charset="-122"/>
+                <a:cs typeface="Times New Roman" panose="02020603050405020304" pitchFamily="18" charset="0"/>
+              </a:rPr>
+              <a:t>dp</a:t>
+            </a:r>
+            <a:r>
+              <a:rPr lang="en-US" altLang="zh-CN" dirty="0">
+                <a:latin typeface="Times New Roman" panose="02020603050405020304" pitchFamily="18" charset="0"/>
+                <a:ea typeface="KaiTi_GB2312" panose="02010609030101010101" pitchFamily="49" charset="-122"/>
+                <a:cs typeface="Times New Roman" panose="02020603050405020304" pitchFamily="18" charset="0"/>
+              </a:rPr>
+              <a:t>[1][6] = True </a:t>
+            </a:r>
+            <a:r>
+              <a:rPr lang="zh-CN" altLang="en-US" dirty="0">
+                <a:latin typeface="Times New Roman" panose="02020603050405020304" pitchFamily="18" charset="0"/>
+                <a:ea typeface="KaiTi_GB2312" panose="02010609030101010101" pitchFamily="49" charset="-122"/>
+                <a:cs typeface="Times New Roman" panose="02020603050405020304" pitchFamily="18" charset="0"/>
+              </a:rPr>
+              <a:t>。</a:t>
+            </a:r>
+          </a:p>
+        </p:txBody>
+      </p:sp>
+      <p:cxnSp>
+        <p:nvCxnSpPr>
+          <p:cNvPr id="12" name="直线箭头连接符 11">
+            <a:extLst>
+              <a:ext uri="{FF2B5EF4-FFF2-40B4-BE49-F238E27FC236}">
+                <a16:creationId xmlns:a16="http://schemas.microsoft.com/office/drawing/2014/main" id="{7C660245-D22E-A24F-8D6F-515D35AA5F7C}"/>
+              </a:ext>
+            </a:extLst>
+          </p:cNvPr>
+          <p:cNvCxnSpPr>
+            <a:cxnSpLocks/>
+          </p:cNvCxnSpPr>
+          <p:nvPr/>
+        </p:nvCxnSpPr>
+        <p:spPr>
+          <a:xfrm flipH="1" flipV="1">
+            <a:off x="7549661" y="2899004"/>
+            <a:ext cx="3001109" cy="629946"/>
+          </a:xfrm>
+          <a:prstGeom prst="straightConnector1">
+            <a:avLst/>
+          </a:prstGeom>
+          <a:ln w="88900">
+            <a:solidFill>
+              <a:srgbClr val="FF0000"/>
+            </a:solidFill>
+            <a:tailEnd type="triangle"/>
+          </a:ln>
+          <a:effectLst>
+            <a:outerShdw blurRad="50800" dist="38100" algn="l" rotWithShape="0">
+              <a:prstClr val="black">
+                <a:alpha val="40000"/>
+              </a:prstClr>
+            </a:outerShdw>
+          </a:effectLst>
+        </p:spPr>
+        <p:style>
+          <a:lnRef idx="1">
+            <a:schemeClr val="accent1"/>
+          </a:lnRef>
+          <a:fillRef idx="0">
+            <a:schemeClr val="accent1"/>
+          </a:fillRef>
+          <a:effectRef idx="0">
+            <a:schemeClr val="accent1"/>
+          </a:effectRef>
+          <a:fontRef idx="minor">
+            <a:schemeClr val="tx1"/>
+          </a:fontRef>
+        </p:style>
+      </p:cxnSp>
+      <p:cxnSp>
+        <p:nvCxnSpPr>
+          <p:cNvPr id="13" name="直线箭头连接符 12">
+            <a:extLst>
+              <a:ext uri="{FF2B5EF4-FFF2-40B4-BE49-F238E27FC236}">
+                <a16:creationId xmlns:a16="http://schemas.microsoft.com/office/drawing/2014/main" id="{0B25A163-015B-4343-A8E6-A55CD470C4DE}"/>
+              </a:ext>
+            </a:extLst>
+          </p:cNvPr>
+          <p:cNvCxnSpPr>
+            <a:cxnSpLocks/>
+          </p:cNvCxnSpPr>
+          <p:nvPr/>
+        </p:nvCxnSpPr>
+        <p:spPr>
+          <a:xfrm flipV="1">
+            <a:off x="10905982" y="2899004"/>
+            <a:ext cx="1" cy="494746"/>
+          </a:xfrm>
+          <a:prstGeom prst="straightConnector1">
+            <a:avLst/>
+          </a:prstGeom>
+          <a:ln w="88900">
+            <a:solidFill>
+              <a:srgbClr val="FF0000"/>
+            </a:solidFill>
+            <a:tailEnd type="triangle"/>
+          </a:ln>
+          <a:effectLst>
+            <a:outerShdw blurRad="50800" dist="38100" algn="l" rotWithShape="0">
+              <a:prstClr val="black">
+                <a:alpha val="40000"/>
+              </a:prstClr>
+            </a:outerShdw>
+          </a:effectLst>
+        </p:spPr>
+        <p:style>
+          <a:lnRef idx="1">
+            <a:schemeClr val="accent1"/>
+          </a:lnRef>
+          <a:fillRef idx="0">
+            <a:schemeClr val="accent1"/>
+          </a:fillRef>
+          <a:effectRef idx="0">
+            <a:schemeClr val="accent1"/>
+          </a:effectRef>
+          <a:fontRef idx="minor">
+            <a:schemeClr val="tx1"/>
+          </a:fontRef>
+        </p:style>
+      </p:cxnSp>
+      <p:sp>
+        <p:nvSpPr>
+          <p:cNvPr id="9" name="矩形 8">
+            <a:extLst>
+              <a:ext uri="{FF2B5EF4-FFF2-40B4-BE49-F238E27FC236}">
+                <a16:creationId xmlns:a16="http://schemas.microsoft.com/office/drawing/2014/main" id="{F4A58583-811F-574F-B2ED-CB2709DCAD75}"/>
+              </a:ext>
+            </a:extLst>
+          </p:cNvPr>
+          <p:cNvSpPr/>
+          <p:nvPr/>
+        </p:nvSpPr>
+        <p:spPr>
+          <a:xfrm>
+            <a:off x="2161880" y="102000"/>
+            <a:ext cx="6186309" cy="461665"/>
+          </a:xfrm>
+          <a:prstGeom prst="rect">
+            <a:avLst/>
+          </a:prstGeom>
+        </p:spPr>
+        <p:txBody>
+          <a:bodyPr wrap="none">
+            <a:spAutoFit/>
+          </a:bodyPr>
+          <a:lstStyle/>
+          <a:p>
+            <a:r>
+              <a:rPr kumimoji="1" lang="zh-CN" altLang="en-US" sz="2400" dirty="0">
+                <a:solidFill>
+                  <a:schemeClr val="bg1"/>
+                </a:solidFill>
+                <a:latin typeface="Times New Roman" charset="0"/>
+                <a:ea typeface="黑体" charset="-122"/>
+              </a:rPr>
+              <a:t>第 </a:t>
+            </a:r>
+            <a:r>
+              <a:rPr kumimoji="1" lang="en-US" altLang="zh-CN" sz="2400" dirty="0">
+                <a:solidFill>
+                  <a:schemeClr val="bg1"/>
+                </a:solidFill>
+                <a:latin typeface="Times New Roman" charset="0"/>
+                <a:ea typeface="黑体" charset="-122"/>
+              </a:rPr>
+              <a:t>416</a:t>
+            </a:r>
+            <a:r>
+              <a:rPr kumimoji="1" lang="zh-CN" altLang="en-US" sz="2400" dirty="0">
+                <a:solidFill>
+                  <a:schemeClr val="bg1"/>
+                </a:solidFill>
+                <a:latin typeface="Times New Roman" charset="0"/>
+                <a:ea typeface="黑体" charset="-122"/>
+              </a:rPr>
+              <a:t> 题</a:t>
+            </a:r>
+            <a:r>
+              <a:rPr kumimoji="1" lang="zh-CN" altLang="en-US" sz="2400" dirty="0">
+                <a:solidFill>
+                  <a:schemeClr val="bg1"/>
+                </a:solidFill>
+                <a:latin typeface="KaiTi" panose="02010609060101010101" pitchFamily="49" charset="-122"/>
+                <a:ea typeface="KaiTi" panose="02010609060101010101" pitchFamily="49" charset="-122"/>
+              </a:rPr>
+              <a:t>：“分割等和子集”题解配图（</a:t>
+            </a:r>
+            <a:r>
+              <a:rPr kumimoji="1" lang="en-US" altLang="zh-CN" sz="2400" dirty="0">
+                <a:solidFill>
+                  <a:schemeClr val="bg1"/>
+                </a:solidFill>
+                <a:latin typeface="Times New Roman" panose="02020603050405020304" pitchFamily="18" charset="0"/>
+                <a:ea typeface="KaiTi" panose="02010609060101010101" pitchFamily="49" charset="-122"/>
+                <a:cs typeface="Times New Roman" panose="02020603050405020304" pitchFamily="18" charset="0"/>
+              </a:rPr>
+              <a:t>2</a:t>
+            </a:r>
+            <a:r>
+              <a:rPr kumimoji="1" lang="zh-CN" altLang="en-US" sz="2400" dirty="0">
+                <a:solidFill>
+                  <a:schemeClr val="bg1"/>
+                </a:solidFill>
+                <a:latin typeface="KaiTi" panose="02010609060101010101" pitchFamily="49" charset="-122"/>
+                <a:ea typeface="KaiTi" panose="02010609060101010101" pitchFamily="49" charset="-122"/>
+              </a:rPr>
+              <a:t>）</a:t>
+            </a:r>
+            <a:endParaRPr lang="zh-CN" altLang="en-US" dirty="0">
+              <a:solidFill>
+                <a:schemeClr val="bg1"/>
+              </a:solidFill>
+            </a:endParaRPr>
+          </a:p>
+        </p:txBody>
+      </p:sp>
+    </p:spTree>
+    <p:extLst>
+      <p:ext uri="{BB962C8B-B14F-4D97-AF65-F5344CB8AC3E}">
+        <p14:creationId xmlns:p14="http://schemas.microsoft.com/office/powerpoint/2010/main" val="1679646594"/>
       </p:ext>
     </p:extLst>
   </p:cSld>

</xml_diff>